<commit_message>
4강 ppt. pdf 업로드
</commit_message>
<xml_diff>
--- a/HTML(전체)/5월 12일 폴더/4강 과제 제출(손영식).pptx
+++ b/HTML(전체)/5월 12일 폴더/4강 과제 제출(손영식).pptx
@@ -21,8 +21,9 @@
     <p:sldId id="329" r:id="rId15"/>
     <p:sldId id="330" r:id="rId16"/>
     <p:sldId id="331" r:id="rId17"/>
-    <p:sldId id="332" r:id="rId18"/>
-    <p:sldId id="333" r:id="rId19"/>
+    <p:sldId id="334" r:id="rId18"/>
+    <p:sldId id="332" r:id="rId19"/>
+    <p:sldId id="333" r:id="rId20"/>
   </p:sldIdLst>
   <p:sldSz cx="12192000" cy="6858000"/>
   <p:notesSz cx="6858000" cy="9144000"/>
@@ -260,7 +261,7 @@
           <a:p>
             <a:fld id="{428EE891-A21A-4EED-B42B-B99D1C950FC1}" type="datetimeFigureOut">
               <a:rPr lang="ko-KR" altLang="en-US" smtClean="0"/>
-              <a:t>2022-05-12</a:t>
+              <a:t>2022-05-13</a:t>
             </a:fld>
             <a:endParaRPr lang="ko-KR" altLang="en-US"/>
           </a:p>
@@ -430,7 +431,7 @@
           <a:p>
             <a:fld id="{428EE891-A21A-4EED-B42B-B99D1C950FC1}" type="datetimeFigureOut">
               <a:rPr lang="ko-KR" altLang="en-US" smtClean="0"/>
-              <a:t>2022-05-12</a:t>
+              <a:t>2022-05-13</a:t>
             </a:fld>
             <a:endParaRPr lang="ko-KR" altLang="en-US"/>
           </a:p>
@@ -610,7 +611,7 @@
           <a:p>
             <a:fld id="{428EE891-A21A-4EED-B42B-B99D1C950FC1}" type="datetimeFigureOut">
               <a:rPr lang="ko-KR" altLang="en-US" smtClean="0"/>
-              <a:t>2022-05-12</a:t>
+              <a:t>2022-05-13</a:t>
             </a:fld>
             <a:endParaRPr lang="ko-KR" altLang="en-US"/>
           </a:p>
@@ -780,7 +781,7 @@
           <a:p>
             <a:fld id="{428EE891-A21A-4EED-B42B-B99D1C950FC1}" type="datetimeFigureOut">
               <a:rPr lang="ko-KR" altLang="en-US" smtClean="0"/>
-              <a:t>2022-05-12</a:t>
+              <a:t>2022-05-13</a:t>
             </a:fld>
             <a:endParaRPr lang="ko-KR" altLang="en-US"/>
           </a:p>
@@ -1026,7 +1027,7 @@
           <a:p>
             <a:fld id="{428EE891-A21A-4EED-B42B-B99D1C950FC1}" type="datetimeFigureOut">
               <a:rPr lang="ko-KR" altLang="en-US" smtClean="0"/>
-              <a:t>2022-05-12</a:t>
+              <a:t>2022-05-13</a:t>
             </a:fld>
             <a:endParaRPr lang="ko-KR" altLang="en-US"/>
           </a:p>
@@ -1258,7 +1259,7 @@
           <a:p>
             <a:fld id="{428EE891-A21A-4EED-B42B-B99D1C950FC1}" type="datetimeFigureOut">
               <a:rPr lang="ko-KR" altLang="en-US" smtClean="0"/>
-              <a:t>2022-05-12</a:t>
+              <a:t>2022-05-13</a:t>
             </a:fld>
             <a:endParaRPr lang="ko-KR" altLang="en-US"/>
           </a:p>
@@ -1625,7 +1626,7 @@
           <a:p>
             <a:fld id="{428EE891-A21A-4EED-B42B-B99D1C950FC1}" type="datetimeFigureOut">
               <a:rPr lang="ko-KR" altLang="en-US" smtClean="0"/>
-              <a:t>2022-05-12</a:t>
+              <a:t>2022-05-13</a:t>
             </a:fld>
             <a:endParaRPr lang="ko-KR" altLang="en-US"/>
           </a:p>
@@ -1743,7 +1744,7 @@
           <a:p>
             <a:fld id="{428EE891-A21A-4EED-B42B-B99D1C950FC1}" type="datetimeFigureOut">
               <a:rPr lang="ko-KR" altLang="en-US" smtClean="0"/>
-              <a:t>2022-05-12</a:t>
+              <a:t>2022-05-13</a:t>
             </a:fld>
             <a:endParaRPr lang="ko-KR" altLang="en-US"/>
           </a:p>
@@ -1838,7 +1839,7 @@
           <a:p>
             <a:fld id="{428EE891-A21A-4EED-B42B-B99D1C950FC1}" type="datetimeFigureOut">
               <a:rPr lang="ko-KR" altLang="en-US" smtClean="0"/>
-              <a:t>2022-05-12</a:t>
+              <a:t>2022-05-13</a:t>
             </a:fld>
             <a:endParaRPr lang="ko-KR" altLang="en-US"/>
           </a:p>
@@ -2115,7 +2116,7 @@
           <a:p>
             <a:fld id="{428EE891-A21A-4EED-B42B-B99D1C950FC1}" type="datetimeFigureOut">
               <a:rPr lang="ko-KR" altLang="en-US" smtClean="0"/>
-              <a:t>2022-05-12</a:t>
+              <a:t>2022-05-13</a:t>
             </a:fld>
             <a:endParaRPr lang="ko-KR" altLang="en-US"/>
           </a:p>
@@ -2368,7 +2369,7 @@
           <a:p>
             <a:fld id="{428EE891-A21A-4EED-B42B-B99D1C950FC1}" type="datetimeFigureOut">
               <a:rPr lang="ko-KR" altLang="en-US" smtClean="0"/>
-              <a:t>2022-05-12</a:t>
+              <a:t>2022-05-13</a:t>
             </a:fld>
             <a:endParaRPr lang="ko-KR" altLang="en-US"/>
           </a:p>
@@ -2581,7 +2582,7 @@
           <a:p>
             <a:fld id="{428EE891-A21A-4EED-B42B-B99D1C950FC1}" type="datetimeFigureOut">
               <a:rPr lang="ko-KR" altLang="en-US" smtClean="0"/>
-              <a:t>2022-05-12</a:t>
+              <a:t>2022-05-13</a:t>
             </a:fld>
             <a:endParaRPr lang="ko-KR" altLang="en-US"/>
           </a:p>
@@ -3132,6 +3133,13 @@
   <p:clrMapOvr>
     <a:masterClrMapping/>
   </p:clrMapOvr>
+  <p:timing>
+    <p:tnLst>
+      <p:par>
+        <p:cTn id="1" dur="indefinite" restart="never" nodeType="tmRoot"/>
+      </p:par>
+    </p:tnLst>
+  </p:timing>
 </p:sld>
 </file>
 
@@ -16192,7 +16200,31 @@
                   <a:srgbClr val="FF0000"/>
                 </a:solidFill>
               </a:rPr>
-              <a:t>- 5</a:t>
+              <a:t>– 4 </a:t>
+            </a:r>
+            <a:r>
+              <a:rPr lang="ko-KR" altLang="en-US" b="1" dirty="0" smtClean="0">
+                <a:solidFill>
+                  <a:srgbClr val="FF0000"/>
+                </a:solidFill>
+              </a:rPr>
+              <a:t>집에서 </a:t>
+            </a:r>
+            <a:r>
+              <a:rPr lang="ko-KR" altLang="en-US" b="1" dirty="0" err="1" smtClean="0">
+                <a:solidFill>
+                  <a:srgbClr val="FF0000"/>
+                </a:solidFill>
+              </a:rPr>
+              <a:t>구글링해서</a:t>
+            </a:r>
+            <a:r>
+              <a:rPr lang="ko-KR" altLang="en-US" b="1" dirty="0" smtClean="0">
+                <a:solidFill>
+                  <a:srgbClr val="FF0000"/>
+                </a:solidFill>
+              </a:rPr>
+              <a:t> 다시 해보기</a:t>
             </a:r>
             <a:endParaRPr lang="ko-KR" altLang="en-US" b="1" dirty="0">
               <a:solidFill>
@@ -16202,10 +16234,58 @@
           </a:p>
         </p:txBody>
       </p:sp>
+      <p:pic>
+        <p:nvPicPr>
+          <p:cNvPr id="2" name="그림 1"/>
+          <p:cNvPicPr>
+            <a:picLocks noChangeAspect="1"/>
+          </p:cNvPicPr>
+          <p:nvPr/>
+        </p:nvPicPr>
+        <p:blipFill>
+          <a:blip r:embed="rId2"/>
+          <a:stretch>
+            <a:fillRect/>
+          </a:stretch>
+        </p:blipFill>
+        <p:spPr>
+          <a:xfrm>
+            <a:off x="7479070" y="2401454"/>
+            <a:ext cx="3495733" cy="1319184"/>
+          </a:xfrm>
+          <a:prstGeom prst="rect">
+            <a:avLst/>
+          </a:prstGeom>
+        </p:spPr>
+      </p:pic>
+      <p:pic>
+        <p:nvPicPr>
+          <p:cNvPr id="8" name="그림 7"/>
+          <p:cNvPicPr>
+            <a:picLocks noChangeAspect="1"/>
+          </p:cNvPicPr>
+          <p:nvPr/>
+        </p:nvPicPr>
+        <p:blipFill>
+          <a:blip r:embed="rId3"/>
+          <a:stretch>
+            <a:fillRect/>
+          </a:stretch>
+        </p:blipFill>
+        <p:spPr>
+          <a:xfrm>
+            <a:off x="867660" y="217675"/>
+            <a:ext cx="4374900" cy="5686742"/>
+          </a:xfrm>
+          <a:prstGeom prst="rect">
+            <a:avLst/>
+          </a:prstGeom>
+        </p:spPr>
+      </p:pic>
     </p:spTree>
     <p:extLst>
       <p:ext uri="{BB962C8B-B14F-4D97-AF65-F5344CB8AC3E}">
-        <p14:creationId xmlns:p14="http://schemas.microsoft.com/office/powerpoint/2010/main" val="906225333"/>
+        <p14:creationId xmlns:p14="http://schemas.microsoft.com/office/powerpoint/2010/main" val="1333840368"/>
       </p:ext>
     </p:extLst>
   </p:cSld>
@@ -16371,7 +16451,39 @@
                   <a:srgbClr val="FF0000"/>
                 </a:solidFill>
               </a:rPr>
-              <a:t>- 6</a:t>
+              <a:t>– 5 </a:t>
+            </a:r>
+            <a:r>
+              <a:rPr lang="ko-KR" altLang="en-US" b="1" dirty="0" smtClean="0">
+                <a:solidFill>
+                  <a:srgbClr val="FF0000"/>
+                </a:solidFill>
+              </a:rPr>
+              <a:t>잘하시는 </a:t>
+            </a:r>
+            <a:r>
+              <a:rPr lang="ko-KR" altLang="en-US" b="1" dirty="0" err="1" smtClean="0">
+                <a:solidFill>
+                  <a:srgbClr val="FF0000"/>
+                </a:solidFill>
+              </a:rPr>
+              <a:t>분꺼</a:t>
+            </a:r>
+            <a:r>
+              <a:rPr lang="ko-KR" altLang="en-US" b="1" dirty="0" smtClean="0">
+                <a:solidFill>
+                  <a:srgbClr val="FF0000"/>
+                </a:solidFill>
+              </a:rPr>
+              <a:t> 참고했어요</a:t>
+            </a:r>
+            <a:r>
+              <a:rPr lang="en-US" altLang="ko-KR" b="1" dirty="0" smtClean="0">
+                <a:solidFill>
+                  <a:srgbClr val="FF0000"/>
+                </a:solidFill>
+              </a:rPr>
+              <a:t>! </a:t>
             </a:r>
             <a:endParaRPr lang="ko-KR" altLang="en-US" b="1" dirty="0">
               <a:solidFill>
@@ -16381,6 +16493,344 @@
           </a:p>
         </p:txBody>
       </p:sp>
+      <p:pic>
+        <p:nvPicPr>
+          <p:cNvPr id="2" name="그림 1"/>
+          <p:cNvPicPr>
+            <a:picLocks noChangeAspect="1"/>
+          </p:cNvPicPr>
+          <p:nvPr/>
+        </p:nvPicPr>
+        <p:blipFill>
+          <a:blip r:embed="rId2"/>
+          <a:stretch>
+            <a:fillRect/>
+          </a:stretch>
+        </p:blipFill>
+        <p:spPr>
+          <a:xfrm>
+            <a:off x="669104" y="202896"/>
+            <a:ext cx="4432935" cy="5720652"/>
+          </a:xfrm>
+          <a:prstGeom prst="rect">
+            <a:avLst/>
+          </a:prstGeom>
+        </p:spPr>
+      </p:pic>
+      <p:pic>
+        <p:nvPicPr>
+          <p:cNvPr id="3" name="그림 2"/>
+          <p:cNvPicPr>
+            <a:picLocks noChangeAspect="1"/>
+          </p:cNvPicPr>
+          <p:nvPr/>
+        </p:nvPicPr>
+        <p:blipFill>
+          <a:blip r:embed="rId3"/>
+          <a:stretch>
+            <a:fillRect/>
+          </a:stretch>
+        </p:blipFill>
+        <p:spPr>
+          <a:xfrm>
+            <a:off x="6235700" y="3063222"/>
+            <a:ext cx="5529580" cy="1328883"/>
+          </a:xfrm>
+          <a:prstGeom prst="rect">
+            <a:avLst/>
+          </a:prstGeom>
+        </p:spPr>
+      </p:pic>
+    </p:spTree>
+    <p:extLst>
+      <p:ext uri="{BB962C8B-B14F-4D97-AF65-F5344CB8AC3E}">
+        <p14:creationId xmlns:p14="http://schemas.microsoft.com/office/powerpoint/2010/main" val="906225333"/>
+      </p:ext>
+    </p:extLst>
+  </p:cSld>
+  <p:clrMapOvr>
+    <a:masterClrMapping/>
+  </p:clrMapOvr>
+  <p:timing>
+    <p:tnLst>
+      <p:par>
+        <p:cTn id="1" dur="indefinite" restart="never" nodeType="tmRoot"/>
+      </p:par>
+    </p:tnLst>
+  </p:timing>
+</p:sld>
+</file>
+
+<file path=ppt/slides/slide19.xml><?xml version="1.0" encoding="utf-8"?>
+<p:sld xmlns:a="http://schemas.openxmlformats.org/drawingml/2006/main" xmlns:r="http://schemas.openxmlformats.org/officeDocument/2006/relationships" xmlns:p="http://schemas.openxmlformats.org/presentationml/2006/main">
+  <p:cSld>
+    <p:spTree>
+      <p:nvGrpSpPr>
+        <p:cNvPr id="1" name=""/>
+        <p:cNvGrpSpPr/>
+        <p:nvPr/>
+      </p:nvGrpSpPr>
+      <p:grpSpPr>
+        <a:xfrm>
+          <a:off x="0" y="0"/>
+          <a:ext cx="0" cy="0"/>
+          <a:chOff x="0" y="0"/>
+          <a:chExt cx="0" cy="0"/>
+        </a:xfrm>
+      </p:grpSpPr>
+      <p:sp>
+        <p:nvSpPr>
+          <p:cNvPr id="7" name="직사각형 6"/>
+          <p:cNvSpPr/>
+          <p:nvPr/>
+        </p:nvSpPr>
+        <p:spPr>
+          <a:xfrm>
+            <a:off x="1265320" y="6045468"/>
+            <a:ext cx="3240504" cy="497305"/>
+          </a:xfrm>
+          <a:prstGeom prst="rect">
+            <a:avLst/>
+          </a:prstGeom>
+        </p:spPr>
+        <p:style>
+          <a:lnRef idx="2">
+            <a:schemeClr val="accent1">
+              <a:shade val="50000"/>
+            </a:schemeClr>
+          </a:lnRef>
+          <a:fillRef idx="1">
+            <a:schemeClr val="accent1"/>
+          </a:fillRef>
+          <a:effectRef idx="0">
+            <a:schemeClr val="accent1"/>
+          </a:effectRef>
+          <a:fontRef idx="minor">
+            <a:schemeClr val="lt1"/>
+          </a:fontRef>
+        </p:style>
+        <p:txBody>
+          <a:bodyPr rtlCol="0" anchor="ctr"/>
+          <a:lstStyle/>
+          <a:p>
+            <a:pPr algn="ctr"/>
+            <a:r>
+              <a:rPr lang="en-US" altLang="ko-KR" b="1" dirty="0" err="1" smtClean="0"/>
+              <a:t>VSCode</a:t>
+            </a:r>
+            <a:r>
+              <a:rPr lang="en-US" altLang="ko-KR" dirty="0" smtClean="0"/>
+              <a:t> </a:t>
+            </a:r>
+            <a:r>
+              <a:rPr lang="ko-KR" altLang="en-US" dirty="0" smtClean="0"/>
+              <a:t>내용</a:t>
+            </a:r>
+            <a:endParaRPr lang="ko-KR" altLang="en-US" dirty="0"/>
+          </a:p>
+        </p:txBody>
+      </p:sp>
+      <p:sp>
+        <p:nvSpPr>
+          <p:cNvPr id="9" name="직사각형 8"/>
+          <p:cNvSpPr/>
+          <p:nvPr/>
+        </p:nvSpPr>
+        <p:spPr>
+          <a:xfrm>
+            <a:off x="7734299" y="6045468"/>
+            <a:ext cx="3240504" cy="497305"/>
+          </a:xfrm>
+          <a:prstGeom prst="rect">
+            <a:avLst/>
+          </a:prstGeom>
+        </p:spPr>
+        <p:style>
+          <a:lnRef idx="2">
+            <a:schemeClr val="accent1">
+              <a:shade val="50000"/>
+            </a:schemeClr>
+          </a:lnRef>
+          <a:fillRef idx="1">
+            <a:schemeClr val="accent1"/>
+          </a:fillRef>
+          <a:effectRef idx="0">
+            <a:schemeClr val="accent1"/>
+          </a:effectRef>
+          <a:fontRef idx="minor">
+            <a:schemeClr val="lt1"/>
+          </a:fontRef>
+        </p:style>
+        <p:txBody>
+          <a:bodyPr rtlCol="0" anchor="ctr"/>
+          <a:lstStyle/>
+          <a:p>
+            <a:pPr algn="ctr"/>
+            <a:r>
+              <a:rPr lang="ko-KR" altLang="en-US" b="1" dirty="0" smtClean="0"/>
+              <a:t>크롬 구현 화면</a:t>
+            </a:r>
+            <a:endParaRPr lang="ko-KR" altLang="en-US" b="1" dirty="0"/>
+          </a:p>
+        </p:txBody>
+      </p:sp>
+      <p:sp>
+        <p:nvSpPr>
+          <p:cNvPr id="6" name="TextBox 5"/>
+          <p:cNvSpPr txBox="1"/>
+          <p:nvPr/>
+        </p:nvSpPr>
+        <p:spPr>
+          <a:xfrm>
+            <a:off x="5890260" y="426720"/>
+            <a:ext cx="5715000" cy="369332"/>
+          </a:xfrm>
+          <a:prstGeom prst="rect">
+            <a:avLst/>
+          </a:prstGeom>
+          <a:noFill/>
+        </p:spPr>
+        <p:txBody>
+          <a:bodyPr wrap="square" rtlCol="0">
+            <a:spAutoFit/>
+          </a:bodyPr>
+          <a:lstStyle/>
+          <a:p>
+            <a:r>
+              <a:rPr lang="ko-KR" altLang="en-US" b="1" dirty="0">
+                <a:solidFill>
+                  <a:srgbClr val="FF0000"/>
+                </a:solidFill>
+              </a:rPr>
+              <a:t>실습하기 </a:t>
+            </a:r>
+            <a:r>
+              <a:rPr lang="en-US" altLang="ko-KR" b="1">
+                <a:solidFill>
+                  <a:srgbClr val="FF0000"/>
+                </a:solidFill>
+              </a:rPr>
+              <a:t>– </a:t>
+            </a:r>
+            <a:r>
+              <a:rPr lang="en-US" altLang="ko-KR" b="1" smtClean="0">
+                <a:solidFill>
+                  <a:srgbClr val="FF0000"/>
+                </a:solidFill>
+              </a:rPr>
+              <a:t>6 </a:t>
+            </a:r>
+            <a:r>
+              <a:rPr lang="ko-KR" altLang="en-US" b="1" dirty="0">
+                <a:solidFill>
+                  <a:srgbClr val="FF0000"/>
+                </a:solidFill>
+              </a:rPr>
+              <a:t>잘하시는 </a:t>
+            </a:r>
+            <a:r>
+              <a:rPr lang="ko-KR" altLang="en-US" b="1" dirty="0" err="1">
+                <a:solidFill>
+                  <a:srgbClr val="FF0000"/>
+                </a:solidFill>
+              </a:rPr>
+              <a:t>분꺼</a:t>
+            </a:r>
+            <a:r>
+              <a:rPr lang="ko-KR" altLang="en-US" b="1" dirty="0">
+                <a:solidFill>
+                  <a:srgbClr val="FF0000"/>
+                </a:solidFill>
+              </a:rPr>
+              <a:t> 참고했어요</a:t>
+            </a:r>
+            <a:r>
+              <a:rPr lang="en-US" altLang="ko-KR" b="1" dirty="0">
+                <a:solidFill>
+                  <a:srgbClr val="FF0000"/>
+                </a:solidFill>
+              </a:rPr>
+              <a:t>! </a:t>
+            </a:r>
+            <a:endParaRPr lang="ko-KR" altLang="en-US" b="1" dirty="0">
+              <a:solidFill>
+                <a:srgbClr val="FF0000"/>
+              </a:solidFill>
+            </a:endParaRPr>
+          </a:p>
+        </p:txBody>
+      </p:sp>
+      <p:pic>
+        <p:nvPicPr>
+          <p:cNvPr id="2" name="그림 1"/>
+          <p:cNvPicPr>
+            <a:picLocks noChangeAspect="1"/>
+          </p:cNvPicPr>
+          <p:nvPr/>
+        </p:nvPicPr>
+        <p:blipFill>
+          <a:blip r:embed="rId2"/>
+          <a:stretch>
+            <a:fillRect/>
+          </a:stretch>
+        </p:blipFill>
+        <p:spPr>
+          <a:xfrm>
+            <a:off x="3316923" y="899969"/>
+            <a:ext cx="3260866" cy="5041582"/>
+          </a:xfrm>
+          <a:prstGeom prst="rect">
+            <a:avLst/>
+          </a:prstGeom>
+        </p:spPr>
+      </p:pic>
+      <p:pic>
+        <p:nvPicPr>
+          <p:cNvPr id="3" name="그림 2"/>
+          <p:cNvPicPr>
+            <a:picLocks noChangeAspect="1"/>
+          </p:cNvPicPr>
+          <p:nvPr/>
+        </p:nvPicPr>
+        <p:blipFill>
+          <a:blip r:embed="rId3"/>
+          <a:stretch>
+            <a:fillRect/>
+          </a:stretch>
+        </p:blipFill>
+        <p:spPr>
+          <a:xfrm>
+            <a:off x="157480" y="899969"/>
+            <a:ext cx="3002280" cy="5041582"/>
+          </a:xfrm>
+          <a:prstGeom prst="rect">
+            <a:avLst/>
+          </a:prstGeom>
+        </p:spPr>
+      </p:pic>
+      <p:pic>
+        <p:nvPicPr>
+          <p:cNvPr id="4" name="그림 3"/>
+          <p:cNvPicPr>
+            <a:picLocks noChangeAspect="1"/>
+          </p:cNvPicPr>
+          <p:nvPr/>
+        </p:nvPicPr>
+        <p:blipFill rotWithShape="1">
+          <a:blip r:embed="rId4"/>
+          <a:srcRect r="37000" b="75926"/>
+          <a:stretch/>
+        </p:blipFill>
+        <p:spPr>
+          <a:xfrm>
+            <a:off x="7388591" y="2825462"/>
+            <a:ext cx="3931920" cy="845155"/>
+          </a:xfrm>
+          <a:prstGeom prst="rect">
+            <a:avLst/>
+          </a:prstGeom>
+        </p:spPr>
+      </p:pic>
     </p:spTree>
     <p:extLst>
       <p:ext uri="{BB962C8B-B14F-4D97-AF65-F5344CB8AC3E}">
@@ -16562,6 +17012,13 @@
   <p:clrMapOvr>
     <a:masterClrMapping/>
   </p:clrMapOvr>
+  <p:timing>
+    <p:tnLst>
+      <p:par>
+        <p:cTn id="1" dur="indefinite" restart="never" nodeType="tmRoot"/>
+      </p:par>
+    </p:tnLst>
+  </p:timing>
 </p:sld>
 </file>
 
@@ -17330,6 +17787,13 @@
   <p:clrMapOvr>
     <a:masterClrMapping/>
   </p:clrMapOvr>
+  <p:timing>
+    <p:tnLst>
+      <p:par>
+        <p:cTn id="1" dur="indefinite" restart="never" nodeType="tmRoot"/>
+      </p:par>
+    </p:tnLst>
+  </p:timing>
 </p:sld>
 </file>
 
@@ -19100,6 +19564,13 @@
   <p:clrMapOvr>
     <a:masterClrMapping/>
   </p:clrMapOvr>
+  <p:timing>
+    <p:tnLst>
+      <p:par>
+        <p:cTn id="1" dur="indefinite" restart="never" nodeType="tmRoot"/>
+      </p:par>
+    </p:tnLst>
+  </p:timing>
 </p:sld>
 </file>
 
@@ -19158,7 +19629,6 @@
               <a:rPr lang="ko-KR" altLang="en-US" b="1" dirty="0"/>
               <a:t>실행</a:t>
             </a:r>
-            <a:endParaRPr lang="ko-KR" altLang="en-US" b="1" dirty="0"/>
           </a:p>
         </p:txBody>
       </p:sp>
@@ -20141,6 +20611,13 @@
   <p:clrMapOvr>
     <a:masterClrMapping/>
   </p:clrMapOvr>
+  <p:timing>
+    <p:tnLst>
+      <p:par>
+        <p:cTn id="1" dur="indefinite" restart="never" nodeType="tmRoot"/>
+      </p:par>
+    </p:tnLst>
+  </p:timing>
 </p:sld>
 </file>
 
@@ -20195,7 +20672,6 @@
               <a:rPr lang="ko-KR" altLang="en-US" b="1" dirty="0"/>
               <a:t>창 실행</a:t>
             </a:r>
-            <a:endParaRPr lang="ko-KR" altLang="en-US" b="1" dirty="0"/>
           </a:p>
         </p:txBody>
       </p:sp>

</xml_diff>